<commit_message>
GF #20851 , updated sdc form op diagram
Updated the SDC Dorm Operations ppt diagram to add "from" after extract in two labels
</commit_message>
<xml_diff>
--- a/input/images-source/sdc-form-operations.pptx
+++ b/input/images-source/sdc-form-operations.pptx
@@ -303,7 +303,7 @@
             <a:fld id="{C69E31BE-431C-4F96-86FE-0099C953F73C}" type="datetimeFigureOut">
               <a:rPr lang="en-US" smtClean="0"/>
               <a:pPr/>
-              <a:t>8/28/2018</a:t>
+              <a:t>11/12/2019</a:t>
             </a:fld>
             <a:endParaRPr lang="en-US"/>
           </a:p>
@@ -473,7 +473,7 @@
             <a:fld id="{C69E31BE-431C-4F96-86FE-0099C953F73C}" type="datetimeFigureOut">
               <a:rPr lang="en-US" smtClean="0"/>
               <a:pPr/>
-              <a:t>8/28/2018</a:t>
+              <a:t>11/12/2019</a:t>
             </a:fld>
             <a:endParaRPr lang="en-US"/>
           </a:p>
@@ -653,7 +653,7 @@
             <a:fld id="{C69E31BE-431C-4F96-86FE-0099C953F73C}" type="datetimeFigureOut">
               <a:rPr lang="en-US" smtClean="0"/>
               <a:pPr/>
-              <a:t>8/28/2018</a:t>
+              <a:t>11/12/2019</a:t>
             </a:fld>
             <a:endParaRPr lang="en-US"/>
           </a:p>
@@ -823,7 +823,7 @@
             <a:fld id="{C69E31BE-431C-4F96-86FE-0099C953F73C}" type="datetimeFigureOut">
               <a:rPr lang="en-US" smtClean="0"/>
               <a:pPr/>
-              <a:t>8/28/2018</a:t>
+              <a:t>11/12/2019</a:t>
             </a:fld>
             <a:endParaRPr lang="en-US"/>
           </a:p>
@@ -1070,7 +1070,7 @@
             <a:fld id="{C69E31BE-431C-4F96-86FE-0099C953F73C}" type="datetimeFigureOut">
               <a:rPr lang="en-US" smtClean="0"/>
               <a:pPr/>
-              <a:t>8/28/2018</a:t>
+              <a:t>11/12/2019</a:t>
             </a:fld>
             <a:endParaRPr lang="en-US"/>
           </a:p>
@@ -1357,7 +1357,7 @@
             <a:fld id="{C69E31BE-431C-4F96-86FE-0099C953F73C}" type="datetimeFigureOut">
               <a:rPr lang="en-US" smtClean="0"/>
               <a:pPr/>
-              <a:t>8/28/2018</a:t>
+              <a:t>11/12/2019</a:t>
             </a:fld>
             <a:endParaRPr lang="en-US"/>
           </a:p>
@@ -1778,7 +1778,7 @@
             <a:fld id="{C69E31BE-431C-4F96-86FE-0099C953F73C}" type="datetimeFigureOut">
               <a:rPr lang="en-US" smtClean="0"/>
               <a:pPr/>
-              <a:t>8/28/2018</a:t>
+              <a:t>11/12/2019</a:t>
             </a:fld>
             <a:endParaRPr lang="en-US"/>
           </a:p>
@@ -1897,7 +1897,7 @@
             <a:fld id="{C69E31BE-431C-4F96-86FE-0099C953F73C}" type="datetimeFigureOut">
               <a:rPr lang="en-US" smtClean="0"/>
               <a:pPr/>
-              <a:t>8/28/2018</a:t>
+              <a:t>11/12/2019</a:t>
             </a:fld>
             <a:endParaRPr lang="en-US"/>
           </a:p>
@@ -1994,7 +1994,7 @@
             <a:fld id="{C69E31BE-431C-4F96-86FE-0099C953F73C}" type="datetimeFigureOut">
               <a:rPr lang="en-US" smtClean="0"/>
               <a:pPr/>
-              <a:t>8/28/2018</a:t>
+              <a:t>11/12/2019</a:t>
             </a:fld>
             <a:endParaRPr lang="en-US"/>
           </a:p>
@@ -2271,7 +2271,7 @@
             <a:fld id="{C69E31BE-431C-4F96-86FE-0099C953F73C}" type="datetimeFigureOut">
               <a:rPr lang="en-US" smtClean="0"/>
               <a:pPr/>
-              <a:t>8/28/2018</a:t>
+              <a:t>11/12/2019</a:t>
             </a:fld>
             <a:endParaRPr lang="en-US"/>
           </a:p>
@@ -2525,7 +2525,7 @@
             <a:fld id="{C69E31BE-431C-4F96-86FE-0099C953F73C}" type="datetimeFigureOut">
               <a:rPr lang="en-US" smtClean="0"/>
               <a:pPr/>
-              <a:t>8/28/2018</a:t>
+              <a:t>11/12/2019</a:t>
             </a:fld>
             <a:endParaRPr lang="en-US"/>
           </a:p>
@@ -2738,7 +2738,7 @@
             <a:fld id="{C69E31BE-431C-4F96-86FE-0099C953F73C}" type="datetimeFigureOut">
               <a:rPr lang="en-US" smtClean="0"/>
               <a:pPr/>
-              <a:t>8/28/2018</a:t>
+              <a:t>11/12/2019</a:t>
             </a:fld>
             <a:endParaRPr lang="en-US"/>
           </a:p>
@@ -3570,7 +3570,7 @@
         </p:nvSpPr>
         <p:spPr>
           <a:xfrm>
-            <a:off x="882523" y="1311233"/>
+            <a:off x="872334" y="1391445"/>
             <a:ext cx="1086027" cy="628496"/>
           </a:xfrm>
           <a:prstGeom prst="rect">
@@ -3610,7 +3610,20 @@
                 <a:latin typeface="Arial" pitchFamily="34" charset="0"/>
                 <a:cs typeface="Arial" pitchFamily="34" charset="0"/>
               </a:rPr>
-              <a:t>Query, Create, Update, Extract</a:t>
+              <a:t>Query, Create, Update, </a:t>
+            </a:r>
+          </a:p>
+          <a:p>
+            <a:pPr algn="ctr"/>
+            <a:r>
+              <a:rPr lang="en-CA" sz="1050" dirty="0">
+                <a:solidFill>
+                  <a:schemeClr val="tx1"/>
+                </a:solidFill>
+                <a:latin typeface="Arial" pitchFamily="34" charset="0"/>
+                <a:cs typeface="Arial" pitchFamily="34" charset="0"/>
+              </a:rPr>
+              <a:t>Extract from</a:t>
             </a:r>
             <a:br>
               <a:rPr lang="en-CA" sz="1050" dirty="0">
@@ -3622,7 +3635,7 @@
               </a:rPr>
             </a:br>
             <a:r>
-              <a:rPr lang="en-CA" sz="1050" b="1" dirty="0" err="1">
+              <a:rPr lang="en-CA" sz="1050" b="1" dirty="0">
                 <a:solidFill>
                   <a:schemeClr val="tx1"/>
                 </a:solidFill>
@@ -3631,13 +3644,6 @@
               </a:rPr>
               <a:t>QuestionnaireResponse</a:t>
             </a:r>
-            <a:endParaRPr lang="en-CA" sz="1050" b="1" dirty="0">
-              <a:solidFill>
-                <a:schemeClr val="tx1"/>
-              </a:solidFill>
-              <a:latin typeface="Arial" pitchFamily="34" charset="0"/>
-              <a:cs typeface="Arial" pitchFamily="34" charset="0"/>
-            </a:endParaRPr>
           </a:p>
         </p:txBody>
       </p:sp>
@@ -4052,7 +4058,7 @@
                 <a:latin typeface="Arial" pitchFamily="34" charset="0"/>
                 <a:cs typeface="Arial" pitchFamily="34" charset="0"/>
               </a:rPr>
-              <a:t>Extract</a:t>
+              <a:t>Extract from</a:t>
             </a:r>
             <a:br>
               <a:rPr lang="en-CA" sz="1050" dirty="0">
@@ -4064,7 +4070,7 @@
               </a:rPr>
             </a:br>
             <a:r>
-              <a:rPr lang="en-CA" sz="1050" b="1" dirty="0" err="1">
+              <a:rPr lang="en-CA" sz="1050" b="1" dirty="0">
                 <a:solidFill>
                   <a:schemeClr val="tx1"/>
                 </a:solidFill>
@@ -4073,13 +4079,6 @@
               </a:rPr>
               <a:t>QuestionnaireResponse</a:t>
             </a:r>
-            <a:endParaRPr lang="en-CA" sz="1050" b="1" dirty="0">
-              <a:solidFill>
-                <a:schemeClr val="tx1"/>
-              </a:solidFill>
-              <a:latin typeface="Arial" pitchFamily="34" charset="0"/>
-              <a:cs typeface="Arial" pitchFamily="34" charset="0"/>
-            </a:endParaRPr>
           </a:p>
         </p:txBody>
       </p:sp>
@@ -4377,6 +4376,21 @@
 </file>
 
 <file path=customXml/item1.xml><?xml version="1.0" encoding="utf-8"?>
+<?mso-contentType ?>
+<FormTemplates xmlns="http://schemas.microsoft.com/sharepoint/v3/contenttype/forms">
+  <Display>DocumentLibraryForm</Display>
+  <Edit>DocumentLibraryForm</Edit>
+  <New>DocumentLibraryForm</New>
+</FormTemplates>
+</file>
+
+<file path=customXml/item2.xml><?xml version="1.0" encoding="utf-8"?>
+<p:properties xmlns:p="http://schemas.microsoft.com/office/2006/metadata/properties" xmlns:xsi="http://www.w3.org/2001/XMLSchema-instance">
+  <documentManagement/>
+</p:properties>
+</file>
+
+<file path=customXml/item3.xml><?xml version="1.0" encoding="utf-8"?>
 <ct:contentTypeSchema xmlns:ct="http://schemas.microsoft.com/office/2006/metadata/contentType" xmlns:ma="http://schemas.microsoft.com/office/2006/metadata/properties/metaAttributes" ct:_="" ma:_="" ma:contentTypeName="Document" ma:contentTypeID="0x010100D3F5E47D23D84240B5F10B8B4F54293E" ma:contentTypeVersion="0" ma:contentTypeDescription="Create a new document." ma:contentTypeScope="" ma:versionID="0ea3c98e082845983187a016ca212b05">
   <xsd:schema xmlns:xsd="http://www.w3.org/2001/XMLSchema" xmlns:p="http://schemas.microsoft.com/office/2006/metadata/properties" targetNamespace="http://schemas.microsoft.com/office/2006/metadata/properties" ma:root="true" ma:fieldsID="4aeb20c0e3442673af7ee10786458764">
     <xsd:element name="properties">
@@ -4425,32 +4439,10 @@
 </ct:contentTypeSchema>
 </file>
 
-<file path=customXml/item2.xml><?xml version="1.0" encoding="utf-8"?>
-<p:properties xmlns:p="http://schemas.microsoft.com/office/2006/metadata/properties" xmlns:xsi="http://www.w3.org/2001/XMLSchema-instance">
-  <documentManagement/>
-</p:properties>
-</file>
-
-<file path=customXml/item3.xml><?xml version="1.0" encoding="utf-8"?>
-<?mso-contentType ?>
-<FormTemplates xmlns="http://schemas.microsoft.com/sharepoint/v3/contenttype/forms">
-  <Display>DocumentLibraryForm</Display>
-  <Edit>DocumentLibraryForm</Edit>
-  <New>DocumentLibraryForm</New>
-</FormTemplates>
-</file>
-
 <file path=customXml/itemProps1.xml><?xml version="1.0" encoding="utf-8"?>
-<ds:datastoreItem xmlns:ds="http://schemas.openxmlformats.org/officeDocument/2006/customXml" ds:itemID="{969BE3E0-39C5-46BC-ADE4-928A3D4AA066}">
+<ds:datastoreItem xmlns:ds="http://schemas.openxmlformats.org/officeDocument/2006/customXml" ds:itemID="{93867DCD-913B-4BE7-B218-6A941DDB47CC}">
   <ds:schemaRefs>
-    <ds:schemaRef ds:uri="http://schemas.microsoft.com/office/2006/metadata/contentType"/>
-    <ds:schemaRef ds:uri="http://schemas.microsoft.com/office/2006/metadata/properties/metaAttributes"/>
-    <ds:schemaRef ds:uri="http://www.w3.org/2001/XMLSchema"/>
-    <ds:schemaRef ds:uri="http://schemas.microsoft.com/office/2006/metadata/properties"/>
-    <ds:schemaRef ds:uri="http://schemas.openxmlformats.org/package/2006/metadata/core-properties"/>
-    <ds:schemaRef ds:uri="http://purl.org/dc/elements/1.1/"/>
-    <ds:schemaRef ds:uri="http://purl.org/dc/terms/"/>
-    <ds:schemaRef ds:uri="http://schemas.microsoft.com/office/internal/2005/internalDocumentation"/>
+    <ds:schemaRef ds:uri="http://schemas.microsoft.com/sharepoint/v3/contenttype/forms"/>
   </ds:schemaRefs>
 </ds:datastoreItem>
 </file>
@@ -4470,9 +4462,16 @@
 </file>
 
 <file path=customXml/itemProps3.xml><?xml version="1.0" encoding="utf-8"?>
-<ds:datastoreItem xmlns:ds="http://schemas.openxmlformats.org/officeDocument/2006/customXml" ds:itemID="{93867DCD-913B-4BE7-B218-6A941DDB47CC}">
+<ds:datastoreItem xmlns:ds="http://schemas.openxmlformats.org/officeDocument/2006/customXml" ds:itemID="{969BE3E0-39C5-46BC-ADE4-928A3D4AA066}">
   <ds:schemaRefs>
-    <ds:schemaRef ds:uri="http://schemas.microsoft.com/sharepoint/v3/contenttype/forms"/>
+    <ds:schemaRef ds:uri="http://schemas.microsoft.com/office/2006/metadata/contentType"/>
+    <ds:schemaRef ds:uri="http://schemas.microsoft.com/office/2006/metadata/properties/metaAttributes"/>
+    <ds:schemaRef ds:uri="http://www.w3.org/2001/XMLSchema"/>
+    <ds:schemaRef ds:uri="http://schemas.microsoft.com/office/2006/metadata/properties"/>
+    <ds:schemaRef ds:uri="http://schemas.openxmlformats.org/package/2006/metadata/core-properties"/>
+    <ds:schemaRef ds:uri="http://purl.org/dc/elements/1.1/"/>
+    <ds:schemaRef ds:uri="http://purl.org/dc/terms/"/>
+    <ds:schemaRef ds:uri="http://schemas.microsoft.com/office/internal/2005/internalDocumentation"/>
   </ds:schemaRefs>
 </ds:datastoreItem>
 </file>
</xml_diff>

<commit_message>
Updated diagram and CapabilityStatement https://jira.hl7.org/browse/FHIR-49817
</commit_message>
<xml_diff>
--- a/input/images-source/sdc-form-operations.pptx
+++ b/input/images-source/sdc-form-operations.pptx
@@ -303,7 +303,7 @@
             <a:fld id="{C69E31BE-431C-4F96-86FE-0099C953F73C}" type="datetimeFigureOut">
               <a:rPr lang="en-US" smtClean="0"/>
               <a:pPr/>
-              <a:t>11/12/2019</a:t>
+              <a:t>6/24/2025</a:t>
             </a:fld>
             <a:endParaRPr lang="en-US"/>
           </a:p>
@@ -473,7 +473,7 @@
             <a:fld id="{C69E31BE-431C-4F96-86FE-0099C953F73C}" type="datetimeFigureOut">
               <a:rPr lang="en-US" smtClean="0"/>
               <a:pPr/>
-              <a:t>11/12/2019</a:t>
+              <a:t>6/24/2025</a:t>
             </a:fld>
             <a:endParaRPr lang="en-US"/>
           </a:p>
@@ -653,7 +653,7 @@
             <a:fld id="{C69E31BE-431C-4F96-86FE-0099C953F73C}" type="datetimeFigureOut">
               <a:rPr lang="en-US" smtClean="0"/>
               <a:pPr/>
-              <a:t>11/12/2019</a:t>
+              <a:t>6/24/2025</a:t>
             </a:fld>
             <a:endParaRPr lang="en-US"/>
           </a:p>
@@ -823,7 +823,7 @@
             <a:fld id="{C69E31BE-431C-4F96-86FE-0099C953F73C}" type="datetimeFigureOut">
               <a:rPr lang="en-US" smtClean="0"/>
               <a:pPr/>
-              <a:t>11/12/2019</a:t>
+              <a:t>6/24/2025</a:t>
             </a:fld>
             <a:endParaRPr lang="en-US"/>
           </a:p>
@@ -1070,7 +1070,7 @@
             <a:fld id="{C69E31BE-431C-4F96-86FE-0099C953F73C}" type="datetimeFigureOut">
               <a:rPr lang="en-US" smtClean="0"/>
               <a:pPr/>
-              <a:t>11/12/2019</a:t>
+              <a:t>6/24/2025</a:t>
             </a:fld>
             <a:endParaRPr lang="en-US"/>
           </a:p>
@@ -1357,7 +1357,7 @@
             <a:fld id="{C69E31BE-431C-4F96-86FE-0099C953F73C}" type="datetimeFigureOut">
               <a:rPr lang="en-US" smtClean="0"/>
               <a:pPr/>
-              <a:t>11/12/2019</a:t>
+              <a:t>6/24/2025</a:t>
             </a:fld>
             <a:endParaRPr lang="en-US"/>
           </a:p>
@@ -1778,7 +1778,7 @@
             <a:fld id="{C69E31BE-431C-4F96-86FE-0099C953F73C}" type="datetimeFigureOut">
               <a:rPr lang="en-US" smtClean="0"/>
               <a:pPr/>
-              <a:t>11/12/2019</a:t>
+              <a:t>6/24/2025</a:t>
             </a:fld>
             <a:endParaRPr lang="en-US"/>
           </a:p>
@@ -1897,7 +1897,7 @@
             <a:fld id="{C69E31BE-431C-4F96-86FE-0099C953F73C}" type="datetimeFigureOut">
               <a:rPr lang="en-US" smtClean="0"/>
               <a:pPr/>
-              <a:t>11/12/2019</a:t>
+              <a:t>6/24/2025</a:t>
             </a:fld>
             <a:endParaRPr lang="en-US"/>
           </a:p>
@@ -1994,7 +1994,7 @@
             <a:fld id="{C69E31BE-431C-4F96-86FE-0099C953F73C}" type="datetimeFigureOut">
               <a:rPr lang="en-US" smtClean="0"/>
               <a:pPr/>
-              <a:t>11/12/2019</a:t>
+              <a:t>6/24/2025</a:t>
             </a:fld>
             <a:endParaRPr lang="en-US"/>
           </a:p>
@@ -2271,7 +2271,7 @@
             <a:fld id="{C69E31BE-431C-4F96-86FE-0099C953F73C}" type="datetimeFigureOut">
               <a:rPr lang="en-US" smtClean="0"/>
               <a:pPr/>
-              <a:t>11/12/2019</a:t>
+              <a:t>6/24/2025</a:t>
             </a:fld>
             <a:endParaRPr lang="en-US"/>
           </a:p>
@@ -2525,7 +2525,7 @@
             <a:fld id="{C69E31BE-431C-4F96-86FE-0099C953F73C}" type="datetimeFigureOut">
               <a:rPr lang="en-US" smtClean="0"/>
               <a:pPr/>
-              <a:t>11/12/2019</a:t>
+              <a:t>6/24/2025</a:t>
             </a:fld>
             <a:endParaRPr lang="en-US"/>
           </a:p>
@@ -2738,7 +2738,7 @@
             <a:fld id="{C69E31BE-431C-4F96-86FE-0099C953F73C}" type="datetimeFigureOut">
               <a:rPr lang="en-US" smtClean="0"/>
               <a:pPr/>
-              <a:t>11/12/2019</a:t>
+              <a:t>6/24/2025</a:t>
             </a:fld>
             <a:endParaRPr lang="en-US"/>
           </a:p>
@@ -4059,6 +4059,168 @@
                 <a:cs typeface="Arial" pitchFamily="34" charset="0"/>
               </a:rPr>
               <a:t>Extract from</a:t>
+            </a:r>
+            <a:br>
+              <a:rPr lang="en-CA" sz="1050" dirty="0">
+                <a:solidFill>
+                  <a:schemeClr val="tx1"/>
+                </a:solidFill>
+                <a:latin typeface="Arial" pitchFamily="34" charset="0"/>
+                <a:cs typeface="Arial" pitchFamily="34" charset="0"/>
+              </a:rPr>
+            </a:br>
+            <a:r>
+              <a:rPr lang="en-CA" sz="1050" b="1" dirty="0">
+                <a:solidFill>
+                  <a:schemeClr val="tx1"/>
+                </a:solidFill>
+                <a:latin typeface="Arial" pitchFamily="34" charset="0"/>
+                <a:cs typeface="Arial" pitchFamily="34" charset="0"/>
+              </a:rPr>
+              <a:t>QuestionnaireResponse</a:t>
+            </a:r>
+          </a:p>
+        </p:txBody>
+      </p:sp>
+      <p:cxnSp>
+        <p:nvCxnSpPr>
+          <p:cNvPr id="2" name="Connector: Elbow 1">
+            <a:extLst>
+              <a:ext uri="{FF2B5EF4-FFF2-40B4-BE49-F238E27FC236}">
+                <a16:creationId xmlns:a16="http://schemas.microsoft.com/office/drawing/2014/main" id="{563B6730-A743-4013-BED4-1D67D5C83F2F}"/>
+              </a:ext>
+            </a:extLst>
+          </p:cNvPr>
+          <p:cNvCxnSpPr>
+            <a:cxnSpLocks/>
+          </p:cNvCxnSpPr>
+          <p:nvPr/>
+        </p:nvCxnSpPr>
+        <p:spPr>
+          <a:xfrm rot="16200000" flipV="1">
+            <a:off x="2742668" y="506586"/>
+            <a:ext cx="685128" cy="389022"/>
+          </a:xfrm>
+          <a:prstGeom prst="bentConnector2">
+            <a:avLst/>
+          </a:prstGeom>
+          <a:ln w="19050">
+            <a:headEnd type="none" w="med" len="med"/>
+            <a:tailEnd type="arrow" w="med" len="med"/>
+          </a:ln>
+        </p:spPr>
+        <p:style>
+          <a:lnRef idx="1">
+            <a:schemeClr val="accent1"/>
+          </a:lnRef>
+          <a:fillRef idx="0">
+            <a:schemeClr val="accent1"/>
+          </a:fillRef>
+          <a:effectRef idx="0">
+            <a:schemeClr val="accent1"/>
+          </a:effectRef>
+          <a:fontRef idx="minor">
+            <a:schemeClr val="tx1"/>
+          </a:fontRef>
+        </p:style>
+      </p:cxnSp>
+      <p:cxnSp>
+        <p:nvCxnSpPr>
+          <p:cNvPr id="3" name="Straight Arrow Connector 2">
+            <a:extLst>
+              <a:ext uri="{FF2B5EF4-FFF2-40B4-BE49-F238E27FC236}">
+                <a16:creationId xmlns:a16="http://schemas.microsoft.com/office/drawing/2014/main" id="{BAFE4C56-8702-D7EF-5BFA-5C6D8A942D7D}"/>
+              </a:ext>
+            </a:extLst>
+          </p:cNvPr>
+          <p:cNvCxnSpPr>
+            <a:cxnSpLocks/>
+          </p:cNvCxnSpPr>
+          <p:nvPr/>
+        </p:nvCxnSpPr>
+        <p:spPr>
+          <a:xfrm>
+            <a:off x="2885694" y="1043661"/>
+            <a:ext cx="389022" cy="0"/>
+          </a:xfrm>
+          <a:prstGeom prst="straightConnector1">
+            <a:avLst/>
+          </a:prstGeom>
+          <a:ln w="19050">
+            <a:headEnd type="none" w="med" len="med"/>
+            <a:tailEnd type="none" w="med" len="med"/>
+          </a:ln>
+        </p:spPr>
+        <p:style>
+          <a:lnRef idx="1">
+            <a:schemeClr val="accent1"/>
+          </a:lnRef>
+          <a:fillRef idx="0">
+            <a:schemeClr val="accent1"/>
+          </a:fillRef>
+          <a:effectRef idx="0">
+            <a:schemeClr val="accent1"/>
+          </a:effectRef>
+          <a:fontRef idx="minor">
+            <a:schemeClr val="tx1"/>
+          </a:fontRef>
+        </p:style>
+      </p:cxnSp>
+      <p:sp>
+        <p:nvSpPr>
+          <p:cNvPr id="5" name="Rectangle 4">
+            <a:extLst>
+              <a:ext uri="{FF2B5EF4-FFF2-40B4-BE49-F238E27FC236}">
+                <a16:creationId xmlns:a16="http://schemas.microsoft.com/office/drawing/2014/main" id="{A5DBAFF9-3B4F-D1FE-E1EC-DB4636BFAC67}"/>
+              </a:ext>
+            </a:extLst>
+          </p:cNvPr>
+          <p:cNvSpPr/>
+          <p:nvPr/>
+        </p:nvSpPr>
+        <p:spPr>
+          <a:xfrm>
+            <a:off x="3232546" y="349703"/>
+            <a:ext cx="1066800" cy="685115"/>
+          </a:xfrm>
+          <a:prstGeom prst="rect">
+            <a:avLst/>
+          </a:prstGeom>
+          <a:noFill/>
+          <a:ln>
+            <a:noFill/>
+          </a:ln>
+        </p:spPr>
+        <p:style>
+          <a:lnRef idx="2">
+            <a:schemeClr val="accent1">
+              <a:shade val="50000"/>
+            </a:schemeClr>
+          </a:lnRef>
+          <a:fillRef idx="1">
+            <a:schemeClr val="accent1"/>
+          </a:fillRef>
+          <a:effectRef idx="0">
+            <a:schemeClr val="accent1"/>
+          </a:effectRef>
+          <a:fontRef idx="minor">
+            <a:schemeClr val="lt1"/>
+          </a:fontRef>
+        </p:style>
+        <p:txBody>
+          <a:bodyPr lIns="68575" tIns="34288" rIns="68575" bIns="34288" rtlCol="0" anchor="ctr"/>
+          <a:lstStyle/>
+          <a:p>
+            <a:pPr algn="ctr"/>
+            <a:r>
+              <a:rPr lang="en-CA" sz="1050" dirty="0">
+                <a:solidFill>
+                  <a:schemeClr val="tx1"/>
+                </a:solidFill>
+                <a:latin typeface="Arial" pitchFamily="34" charset="0"/>
+                <a:cs typeface="Arial" pitchFamily="34" charset="0"/>
+              </a:rPr>
+              <a:t>Assemble</a:t>
             </a:r>
             <a:br>
               <a:rPr lang="en-CA" sz="1050" dirty="0">
@@ -4376,21 +4538,6 @@
 </file>
 
 <file path=customXml/item1.xml><?xml version="1.0" encoding="utf-8"?>
-<?mso-contentType ?>
-<FormTemplates xmlns="http://schemas.microsoft.com/sharepoint/v3/contenttype/forms">
-  <Display>DocumentLibraryForm</Display>
-  <Edit>DocumentLibraryForm</Edit>
-  <New>DocumentLibraryForm</New>
-</FormTemplates>
-</file>
-
-<file path=customXml/item2.xml><?xml version="1.0" encoding="utf-8"?>
-<p:properties xmlns:p="http://schemas.microsoft.com/office/2006/metadata/properties" xmlns:xsi="http://www.w3.org/2001/XMLSchema-instance">
-  <documentManagement/>
-</p:properties>
-</file>
-
-<file path=customXml/item3.xml><?xml version="1.0" encoding="utf-8"?>
 <ct:contentTypeSchema xmlns:ct="http://schemas.microsoft.com/office/2006/metadata/contentType" xmlns:ma="http://schemas.microsoft.com/office/2006/metadata/properties/metaAttributes" ct:_="" ma:_="" ma:contentTypeName="Document" ma:contentTypeID="0x010100D3F5E47D23D84240B5F10B8B4F54293E" ma:contentTypeVersion="0" ma:contentTypeDescription="Create a new document." ma:contentTypeScope="" ma:versionID="0ea3c98e082845983187a016ca212b05">
   <xsd:schema xmlns:xsd="http://www.w3.org/2001/XMLSchema" xmlns:p="http://schemas.microsoft.com/office/2006/metadata/properties" targetNamespace="http://schemas.microsoft.com/office/2006/metadata/properties" ma:root="true" ma:fieldsID="4aeb20c0e3442673af7ee10786458764">
     <xsd:element name="properties">
@@ -4439,10 +4586,32 @@
 </ct:contentTypeSchema>
 </file>
 
+<file path=customXml/item2.xml><?xml version="1.0" encoding="utf-8"?>
+<p:properties xmlns:p="http://schemas.microsoft.com/office/2006/metadata/properties" xmlns:xsi="http://www.w3.org/2001/XMLSchema-instance">
+  <documentManagement/>
+</p:properties>
+</file>
+
+<file path=customXml/item3.xml><?xml version="1.0" encoding="utf-8"?>
+<?mso-contentType ?>
+<FormTemplates xmlns="http://schemas.microsoft.com/sharepoint/v3/contenttype/forms">
+  <Display>DocumentLibraryForm</Display>
+  <Edit>DocumentLibraryForm</Edit>
+  <New>DocumentLibraryForm</New>
+</FormTemplates>
+</file>
+
 <file path=customXml/itemProps1.xml><?xml version="1.0" encoding="utf-8"?>
-<ds:datastoreItem xmlns:ds="http://schemas.openxmlformats.org/officeDocument/2006/customXml" ds:itemID="{93867DCD-913B-4BE7-B218-6A941DDB47CC}">
+<ds:datastoreItem xmlns:ds="http://schemas.openxmlformats.org/officeDocument/2006/customXml" ds:itemID="{969BE3E0-39C5-46BC-ADE4-928A3D4AA066}">
   <ds:schemaRefs>
-    <ds:schemaRef ds:uri="http://schemas.microsoft.com/sharepoint/v3/contenttype/forms"/>
+    <ds:schemaRef ds:uri="http://schemas.microsoft.com/office/2006/metadata/contentType"/>
+    <ds:schemaRef ds:uri="http://schemas.microsoft.com/office/2006/metadata/properties/metaAttributes"/>
+    <ds:schemaRef ds:uri="http://www.w3.org/2001/XMLSchema"/>
+    <ds:schemaRef ds:uri="http://schemas.microsoft.com/office/2006/metadata/properties"/>
+    <ds:schemaRef ds:uri="http://schemas.openxmlformats.org/package/2006/metadata/core-properties"/>
+    <ds:schemaRef ds:uri="http://purl.org/dc/elements/1.1/"/>
+    <ds:schemaRef ds:uri="http://purl.org/dc/terms/"/>
+    <ds:schemaRef ds:uri="http://schemas.microsoft.com/office/internal/2005/internalDocumentation"/>
   </ds:schemaRefs>
 </ds:datastoreItem>
 </file>
@@ -4462,16 +4631,9 @@
 </file>
 
 <file path=customXml/itemProps3.xml><?xml version="1.0" encoding="utf-8"?>
-<ds:datastoreItem xmlns:ds="http://schemas.openxmlformats.org/officeDocument/2006/customXml" ds:itemID="{969BE3E0-39C5-46BC-ADE4-928A3D4AA066}">
+<ds:datastoreItem xmlns:ds="http://schemas.openxmlformats.org/officeDocument/2006/customXml" ds:itemID="{93867DCD-913B-4BE7-B218-6A941DDB47CC}">
   <ds:schemaRefs>
-    <ds:schemaRef ds:uri="http://schemas.microsoft.com/office/2006/metadata/contentType"/>
-    <ds:schemaRef ds:uri="http://schemas.microsoft.com/office/2006/metadata/properties/metaAttributes"/>
-    <ds:schemaRef ds:uri="http://www.w3.org/2001/XMLSchema"/>
-    <ds:schemaRef ds:uri="http://schemas.microsoft.com/office/2006/metadata/properties"/>
-    <ds:schemaRef ds:uri="http://schemas.openxmlformats.org/package/2006/metadata/core-properties"/>
-    <ds:schemaRef ds:uri="http://purl.org/dc/elements/1.1/"/>
-    <ds:schemaRef ds:uri="http://purl.org/dc/terms/"/>
-    <ds:schemaRef ds:uri="http://schemas.microsoft.com/office/internal/2005/internalDocumentation"/>
+    <ds:schemaRef ds:uri="http://schemas.microsoft.com/sharepoint/v3/contenttype/forms"/>
   </ds:schemaRefs>
 </ds:datastoreItem>
 </file>
</xml_diff>